<commit_message>
add prototype orchestration and measurer (no test); change print() to logging.info();
</commit_message>
<xml_diff>
--- a/doc/SoftwareDesign/Measurement/MeasurerDesign.pptx
+++ b/doc/SoftwareDesign/Measurement/MeasurerDesign.pptx
@@ -3569,6 +3569,14 @@
           </a:p>
           <a:p>
             <a:pPr lvl="1"/>
+            <a:endParaRPr lang="en-US" altLang="zh-CN" dirty="0">
+              <a:solidFill>
+                <a:srgbClr val="FF0000"/>
+              </a:solidFill>
+            </a:endParaRPr>
+          </a:p>
+          <a:p>
+            <a:pPr lvl="1"/>
             <a:r>
               <a:rPr lang="zh-CN" altLang="en-US" dirty="0"/>
               <a:t>向</a:t>
@@ -3628,6 +3636,14 @@
               </a:rPr>
               <a:t>）</a:t>
             </a:r>
+            <a:endParaRPr lang="en-US" altLang="zh-CN" dirty="0">
+              <a:solidFill>
+                <a:srgbClr val="FF0000"/>
+              </a:solidFill>
+            </a:endParaRPr>
+          </a:p>
+          <a:p>
+            <a:pPr lvl="1"/>
             <a:endParaRPr lang="en-US" altLang="zh-CN" dirty="0">
               <a:solidFill>
                 <a:srgbClr val="FF0000"/>

</xml_diff>